<commit_message>
paper methods first draft
</commit_message>
<xml_diff>
--- a/graphs/model_pred.pptx
+++ b/graphs/model_pred.pptx
@@ -212,7 +212,7 @@
           <a:p>
             <a:fld id="{2BA9245E-B5F0-F743-BF43-C5141509C8EA}" type="datetimeFigureOut">
               <a:rPr lang="en-US" smtClean="0"/>
-              <a:t>9/9/21</a:t>
+              <a:t>4/27/22</a:t>
             </a:fld>
             <a:endParaRPr lang="en-US"/>
           </a:p>
@@ -611,10 +611,7 @@
           <a:bodyPr/>
           <a:lstStyle/>
           <a:p>
-            <a:r>
-              <a:rPr lang="en-US" b="0" dirty="0"/>
-              <a:t>Instead of group level trajectories we estimate parameters for each individual using the same tasks as before. Because we do this on an item level for semantic knowledge, we added a comprehension and production task for each object</a:t>
-            </a:r>
+            <a:endParaRPr lang="en-US" b="0" dirty="0"/>
           </a:p>
         </p:txBody>
       </p:sp>
@@ -961,7 +958,7 @@
           <a:p>
             <a:fld id="{A2F1C438-7051-FF4D-A6C9-5F190C2ADCFE}" type="datetimeFigureOut">
               <a:rPr lang="en-US" smtClean="0"/>
-              <a:t>9/9/21</a:t>
+              <a:t>4/27/22</a:t>
             </a:fld>
             <a:endParaRPr lang="en-US"/>
           </a:p>
@@ -1131,7 +1128,7 @@
           <a:p>
             <a:fld id="{A2F1C438-7051-FF4D-A6C9-5F190C2ADCFE}" type="datetimeFigureOut">
               <a:rPr lang="en-US" smtClean="0"/>
-              <a:t>9/9/21</a:t>
+              <a:t>4/27/22</a:t>
             </a:fld>
             <a:endParaRPr lang="en-US"/>
           </a:p>
@@ -1311,7 +1308,7 @@
           <a:p>
             <a:fld id="{A2F1C438-7051-FF4D-A6C9-5F190C2ADCFE}" type="datetimeFigureOut">
               <a:rPr lang="en-US" smtClean="0"/>
-              <a:t>9/9/21</a:t>
+              <a:t>4/27/22</a:t>
             </a:fld>
             <a:endParaRPr lang="en-US"/>
           </a:p>
@@ -1530,7 +1527,7 @@
           <a:p>
             <a:fld id="{A2F1C438-7051-FF4D-A6C9-5F190C2ADCFE}" type="datetimeFigureOut">
               <a:rPr lang="en-US" smtClean="0"/>
-              <a:t>9/9/21</a:t>
+              <a:t>4/27/22</a:t>
             </a:fld>
             <a:endParaRPr lang="en-US"/>
           </a:p>
@@ -1776,7 +1773,7 @@
           <a:p>
             <a:fld id="{A2F1C438-7051-FF4D-A6C9-5F190C2ADCFE}" type="datetimeFigureOut">
               <a:rPr lang="en-US" smtClean="0"/>
-              <a:t>9/9/21</a:t>
+              <a:t>4/27/22</a:t>
             </a:fld>
             <a:endParaRPr lang="en-US"/>
           </a:p>
@@ -2080,7 +2077,7 @@
           <a:p>
             <a:fld id="{A2F1C438-7051-FF4D-A6C9-5F190C2ADCFE}" type="datetimeFigureOut">
               <a:rPr lang="en-US" smtClean="0"/>
-              <a:t>9/9/21</a:t>
+              <a:t>4/27/22</a:t>
             </a:fld>
             <a:endParaRPr lang="en-US"/>
           </a:p>
@@ -2447,7 +2444,7 @@
           <a:p>
             <a:fld id="{A2F1C438-7051-FF4D-A6C9-5F190C2ADCFE}" type="datetimeFigureOut">
               <a:rPr lang="en-US" smtClean="0"/>
-              <a:t>9/9/21</a:t>
+              <a:t>4/27/22</a:t>
             </a:fld>
             <a:endParaRPr lang="en-US"/>
           </a:p>
@@ -2565,7 +2562,7 @@
           <a:p>
             <a:fld id="{A2F1C438-7051-FF4D-A6C9-5F190C2ADCFE}" type="datetimeFigureOut">
               <a:rPr lang="en-US" smtClean="0"/>
-              <a:t>9/9/21</a:t>
+              <a:t>4/27/22</a:t>
             </a:fld>
             <a:endParaRPr lang="en-US"/>
           </a:p>
@@ -2660,7 +2657,7 @@
           <a:p>
             <a:fld id="{A2F1C438-7051-FF4D-A6C9-5F190C2ADCFE}" type="datetimeFigureOut">
               <a:rPr lang="en-US" smtClean="0"/>
-              <a:t>9/9/21</a:t>
+              <a:t>4/27/22</a:t>
             </a:fld>
             <a:endParaRPr lang="en-US"/>
           </a:p>
@@ -2937,7 +2934,7 @@
           <a:p>
             <a:fld id="{A2F1C438-7051-FF4D-A6C9-5F190C2ADCFE}" type="datetimeFigureOut">
               <a:rPr lang="en-US" smtClean="0"/>
-              <a:t>9/9/21</a:t>
+              <a:t>4/27/22</a:t>
             </a:fld>
             <a:endParaRPr lang="en-US"/>
           </a:p>
@@ -3190,7 +3187,7 @@
           <a:p>
             <a:fld id="{A2F1C438-7051-FF4D-A6C9-5F190C2ADCFE}" type="datetimeFigureOut">
               <a:rPr lang="en-US" smtClean="0"/>
-              <a:t>9/9/21</a:t>
+              <a:t>4/27/22</a:t>
             </a:fld>
             <a:endParaRPr lang="en-US"/>
           </a:p>
@@ -3403,7 +3400,7 @@
           <a:p>
             <a:fld id="{A2F1C438-7051-FF4D-A6C9-5F190C2ADCFE}" type="datetimeFigureOut">
               <a:rPr lang="en-US" smtClean="0"/>
-              <a:t>9/9/21</a:t>
+              <a:t>4/27/22</a:t>
             </a:fld>
             <a:endParaRPr lang="en-US"/>
           </a:p>
@@ -4510,10 +4507,10 @@
       </p:grpSpPr>
       <p:grpSp>
         <p:nvGrpSpPr>
-          <p:cNvPr id="12" name="Group 11">
+          <p:cNvPr id="27" name="Group 26">
             <a:extLst>
               <a:ext uri="{FF2B5EF4-FFF2-40B4-BE49-F238E27FC236}">
-                <a16:creationId xmlns:a16="http://schemas.microsoft.com/office/drawing/2014/main" id="{9258AECF-3D99-BD44-96C7-DB71539C6ED5}"/>
+                <a16:creationId xmlns:a16="http://schemas.microsoft.com/office/drawing/2014/main" id="{9AC85B2C-9B3C-04F1-7EC8-6D62BCBDDD92}"/>
               </a:ext>
             </a:extLst>
           </p:cNvPr>
@@ -4522,18 +4519,18 @@
         </p:nvGrpSpPr>
         <p:grpSpPr>
           <a:xfrm>
-            <a:off x="93605" y="319571"/>
-            <a:ext cx="12063005" cy="6205398"/>
-            <a:chOff x="93605" y="319571"/>
-            <a:chExt cx="12063005" cy="6205398"/>
+            <a:off x="563242" y="491607"/>
+            <a:ext cx="10899543" cy="5523194"/>
+            <a:chOff x="563242" y="491607"/>
+            <a:chExt cx="10899543" cy="5523194"/>
           </a:xfrm>
         </p:grpSpPr>
         <p:sp>
           <p:nvSpPr>
-            <p:cNvPr id="9" name="Rechteck 8">
+            <p:cNvPr id="49" name="Rounded Rectangle 48">
               <a:extLst>
                 <a:ext uri="{FF2B5EF4-FFF2-40B4-BE49-F238E27FC236}">
-                  <a16:creationId xmlns:a16="http://schemas.microsoft.com/office/drawing/2014/main" id="{AADA215F-DE7E-AD4B-B14F-87AEA0812C63}"/>
+                  <a16:creationId xmlns:a16="http://schemas.microsoft.com/office/drawing/2014/main" id="{2885DB2D-9CEC-CA77-C929-AE7D0B7FD8C5}"/>
                 </a:ext>
               </a:extLst>
             </p:cNvPr>
@@ -4542,17 +4539,23 @@
           </p:nvSpPr>
           <p:spPr>
             <a:xfrm>
-              <a:off x="1756994" y="2742012"/>
-              <a:ext cx="310769" cy="338469"/>
+              <a:off x="3072985" y="633340"/>
+              <a:ext cx="5606320" cy="5381461"/>
             </a:xfrm>
-            <a:prstGeom prst="rect">
-              <a:avLst/>
+            <a:prstGeom prst="roundRect">
+              <a:avLst>
+                <a:gd name="adj" fmla="val 8641"/>
+              </a:avLst>
             </a:prstGeom>
             <a:solidFill>
-              <a:schemeClr val="bg1"/>
+              <a:schemeClr val="bg1">
+                <a:lumMod val="95000"/>
+              </a:schemeClr>
             </a:solidFill>
-            <a:ln>
-              <a:noFill/>
+            <a:ln w="12700">
+              <a:solidFill>
+                <a:schemeClr val="tx1"/>
+              </a:solidFill>
             </a:ln>
           </p:spPr>
           <p:style>
@@ -4582,50 +4585,6 @@
         </p:sp>
         <p:cxnSp>
           <p:nvCxnSpPr>
-            <p:cNvPr id="18" name="Gerade Verbindung mit Pfeil 19">
-              <a:extLst>
-                <a:ext uri="{FF2B5EF4-FFF2-40B4-BE49-F238E27FC236}">
-                  <a16:creationId xmlns:a16="http://schemas.microsoft.com/office/drawing/2014/main" id="{4BD55AA0-FE73-C644-9E1E-5E87877F4E30}"/>
-                </a:ext>
-              </a:extLst>
-            </p:cNvPr>
-            <p:cNvCxnSpPr>
-              <a:cxnSpLocks/>
-            </p:cNvCxnSpPr>
-            <p:nvPr/>
-          </p:nvCxnSpPr>
-          <p:spPr>
-            <a:xfrm>
-              <a:off x="2067763" y="1219571"/>
-              <a:ext cx="1317982" cy="1522441"/>
-            </a:xfrm>
-            <a:prstGeom prst="straightConnector1">
-              <a:avLst/>
-            </a:prstGeom>
-            <a:ln w="57150">
-              <a:solidFill>
-                <a:schemeClr val="tx1"/>
-              </a:solidFill>
-              <a:tailEnd type="triangle"/>
-            </a:ln>
-          </p:spPr>
-          <p:style>
-            <a:lnRef idx="1">
-              <a:schemeClr val="accent1"/>
-            </a:lnRef>
-            <a:fillRef idx="0">
-              <a:schemeClr val="accent1"/>
-            </a:fillRef>
-            <a:effectRef idx="0">
-              <a:schemeClr val="accent1"/>
-            </a:effectRef>
-            <a:fontRef idx="minor">
-              <a:schemeClr val="tx1"/>
-            </a:fontRef>
-          </p:style>
-        </p:cxnSp>
-        <p:cxnSp>
-          <p:nvCxnSpPr>
             <p:cNvPr id="28" name="Gerade Verbindung mit Pfeil 51">
               <a:extLst>
                 <a:ext uri="{FF2B5EF4-FFF2-40B4-BE49-F238E27FC236}">
@@ -4640,197 +4599,13 @@
           </p:nvCxnSpPr>
           <p:spPr>
             <a:xfrm>
-              <a:off x="2067763" y="3429000"/>
-              <a:ext cx="910209" cy="0"/>
+              <a:off x="4937422" y="3339375"/>
+              <a:ext cx="302400" cy="0"/>
             </a:xfrm>
             <a:prstGeom prst="straightConnector1">
               <a:avLst/>
             </a:prstGeom>
-            <a:ln w="57150">
-              <a:solidFill>
-                <a:schemeClr val="tx1"/>
-              </a:solidFill>
-              <a:tailEnd type="triangle"/>
-            </a:ln>
-          </p:spPr>
-          <p:style>
-            <a:lnRef idx="1">
-              <a:schemeClr val="accent1"/>
-            </a:lnRef>
-            <a:fillRef idx="0">
-              <a:schemeClr val="accent1"/>
-            </a:fillRef>
-            <a:effectRef idx="0">
-              <a:schemeClr val="accent1"/>
-            </a:effectRef>
-            <a:fontRef idx="minor">
-              <a:schemeClr val="tx1"/>
-            </a:fontRef>
-          </p:style>
-        </p:cxnSp>
-        <p:pic>
-          <p:nvPicPr>
-            <p:cNvPr id="13" name="Picture 12">
-              <a:extLst>
-                <a:ext uri="{FF2B5EF4-FFF2-40B4-BE49-F238E27FC236}">
-                  <a16:creationId xmlns:a16="http://schemas.microsoft.com/office/drawing/2014/main" id="{5A240FD9-236A-084A-A9AF-AF817D16B576}"/>
-                </a:ext>
-              </a:extLst>
-            </p:cNvPr>
-            <p:cNvPicPr>
-              <a:picLocks noChangeAspect="1"/>
-            </p:cNvPicPr>
-            <p:nvPr/>
-          </p:nvPicPr>
-          <p:blipFill>
-            <a:blip r:embed="rId3"/>
-            <a:stretch>
-              <a:fillRect/>
-            </a:stretch>
-          </p:blipFill>
-          <p:spPr>
-            <a:xfrm>
-              <a:off x="93605" y="319571"/>
-              <a:ext cx="1800000" cy="1800000"/>
-            </a:xfrm>
-            <a:prstGeom prst="rect">
-              <a:avLst/>
-            </a:prstGeom>
-            <a:ln w="38100">
-              <a:solidFill>
-                <a:schemeClr val="tx1"/>
-              </a:solidFill>
-            </a:ln>
-          </p:spPr>
-        </p:pic>
-        <p:pic>
-          <p:nvPicPr>
-            <p:cNvPr id="22" name="Picture 21">
-              <a:extLst>
-                <a:ext uri="{FF2B5EF4-FFF2-40B4-BE49-F238E27FC236}">
-                  <a16:creationId xmlns:a16="http://schemas.microsoft.com/office/drawing/2014/main" id="{F5BAA08B-DA29-8E48-AED5-92E9CFDEFBB8}"/>
-                </a:ext>
-              </a:extLst>
-            </p:cNvPr>
-            <p:cNvPicPr>
-              <a:picLocks noChangeAspect="1"/>
-            </p:cNvPicPr>
-            <p:nvPr/>
-          </p:nvPicPr>
-          <p:blipFill>
-            <a:blip r:embed="rId4"/>
-            <a:stretch>
-              <a:fillRect/>
-            </a:stretch>
-          </p:blipFill>
-          <p:spPr>
-            <a:xfrm>
-              <a:off x="93605" y="2503540"/>
-              <a:ext cx="1800000" cy="1800000"/>
-            </a:xfrm>
-            <a:prstGeom prst="rect">
-              <a:avLst/>
-            </a:prstGeom>
-            <a:ln w="38100">
-              <a:solidFill>
-                <a:schemeClr val="tx1"/>
-              </a:solidFill>
-            </a:ln>
-          </p:spPr>
-        </p:pic>
-        <p:pic>
-          <p:nvPicPr>
-            <p:cNvPr id="24" name="Picture 23">
-              <a:extLst>
-                <a:ext uri="{FF2B5EF4-FFF2-40B4-BE49-F238E27FC236}">
-                  <a16:creationId xmlns:a16="http://schemas.microsoft.com/office/drawing/2014/main" id="{554F371B-F554-7F4A-B3D0-079ED5A12DF1}"/>
-                </a:ext>
-              </a:extLst>
-            </p:cNvPr>
-            <p:cNvPicPr>
-              <a:picLocks noChangeAspect="1"/>
-            </p:cNvPicPr>
-            <p:nvPr/>
-          </p:nvPicPr>
-          <p:blipFill>
-            <a:blip r:embed="rId5"/>
-            <a:stretch>
-              <a:fillRect/>
-            </a:stretch>
-          </p:blipFill>
-          <p:spPr>
-            <a:xfrm>
-              <a:off x="5809693" y="2595997"/>
-              <a:ext cx="1800000" cy="1800000"/>
-            </a:xfrm>
-            <a:prstGeom prst="rect">
-              <a:avLst/>
-            </a:prstGeom>
-            <a:ln w="38100">
-              <a:solidFill>
-                <a:schemeClr val="tx1"/>
-              </a:solidFill>
-            </a:ln>
-          </p:spPr>
-        </p:pic>
-        <p:pic>
-          <p:nvPicPr>
-            <p:cNvPr id="35" name="Picture 34">
-              <a:extLst>
-                <a:ext uri="{FF2B5EF4-FFF2-40B4-BE49-F238E27FC236}">
-                  <a16:creationId xmlns:a16="http://schemas.microsoft.com/office/drawing/2014/main" id="{3C22D8A7-20B7-6544-B082-954A436CF942}"/>
-                </a:ext>
-              </a:extLst>
-            </p:cNvPr>
-            <p:cNvPicPr>
-              <a:picLocks noChangeAspect="1"/>
-            </p:cNvPicPr>
-            <p:nvPr/>
-          </p:nvPicPr>
-          <p:blipFill>
-            <a:blip r:embed="rId6"/>
-            <a:stretch>
-              <a:fillRect/>
-            </a:stretch>
-          </p:blipFill>
-          <p:spPr>
-            <a:xfrm>
-              <a:off x="93605" y="4724969"/>
-              <a:ext cx="1800000" cy="1800000"/>
-            </a:xfrm>
-            <a:prstGeom prst="rect">
-              <a:avLst/>
-            </a:prstGeom>
-            <a:ln w="38100">
-              <a:solidFill>
-                <a:schemeClr val="tx1"/>
-              </a:solidFill>
-            </a:ln>
-          </p:spPr>
-        </p:pic>
-        <p:cxnSp>
-          <p:nvCxnSpPr>
-            <p:cNvPr id="27" name="Gerade Verbindung mit Pfeil 19">
-              <a:extLst>
-                <a:ext uri="{FF2B5EF4-FFF2-40B4-BE49-F238E27FC236}">
-                  <a16:creationId xmlns:a16="http://schemas.microsoft.com/office/drawing/2014/main" id="{AACD9438-92B9-464E-9C0B-FD3458D4154C}"/>
-                </a:ext>
-              </a:extLst>
-            </p:cNvPr>
-            <p:cNvCxnSpPr>
-              <a:cxnSpLocks/>
-            </p:cNvCxnSpPr>
-            <p:nvPr/>
-          </p:nvCxnSpPr>
-          <p:spPr>
-            <a:xfrm flipV="1">
-              <a:off x="2067763" y="4065373"/>
-              <a:ext cx="1317982" cy="1559597"/>
-            </a:xfrm>
-            <a:prstGeom prst="straightConnector1">
-              <a:avLst/>
-            </a:prstGeom>
-            <a:ln w="57150">
+            <a:ln w="12700">
               <a:solidFill>
                 <a:schemeClr val="tx1"/>
               </a:solidFill>
@@ -4868,13 +4643,13 @@
           </p:nvSpPr>
           <p:spPr>
             <a:xfrm>
-              <a:off x="3102702" y="2462003"/>
-              <a:ext cx="1933994" cy="1933994"/>
+              <a:off x="5332621" y="2651608"/>
+              <a:ext cx="1338884" cy="1338884"/>
             </a:xfrm>
             <a:prstGeom prst="diamond">
               <a:avLst/>
             </a:prstGeom>
-            <a:ln w="38100">
+            <a:ln w="12700">
               <a:solidFill>
                 <a:schemeClr val="tx1"/>
               </a:solidFill>
@@ -4900,7 +4675,7 @@
             <a:p>
               <a:pPr algn="ctr"/>
               <a:r>
-                <a:rPr lang="en-US" sz="2800" dirty="0">
+                <a:rPr lang="en-US" dirty="0">
                   <a:latin typeface="Arial" panose="020B0604020202020204" pitchFamily="34" charset="0"/>
                   <a:cs typeface="Arial" panose="020B0604020202020204" pitchFamily="34" charset="0"/>
                 </a:rPr>
@@ -4925,13 +4700,494 @@
           </p:nvCxnSpPr>
           <p:spPr>
             <a:xfrm>
-              <a:off x="5181034" y="3429000"/>
-              <a:ext cx="466002" cy="0"/>
+              <a:off x="6771430" y="3321050"/>
+              <a:ext cx="302400" cy="0"/>
             </a:xfrm>
             <a:prstGeom prst="straightConnector1">
               <a:avLst/>
             </a:prstGeom>
-            <a:ln w="57150">
+            <a:ln w="12700">
+              <a:solidFill>
+                <a:schemeClr val="tx1"/>
+              </a:solidFill>
+              <a:tailEnd type="triangle"/>
+            </a:ln>
+          </p:spPr>
+          <p:style>
+            <a:lnRef idx="1">
+              <a:schemeClr val="accent1"/>
+            </a:lnRef>
+            <a:fillRef idx="0">
+              <a:schemeClr val="accent1"/>
+            </a:fillRef>
+            <a:effectRef idx="0">
+              <a:schemeClr val="accent1"/>
+            </a:effectRef>
+            <a:fontRef idx="minor">
+              <a:schemeClr val="tx1"/>
+            </a:fontRef>
+          </p:style>
+        </p:cxnSp>
+        <p:pic>
+          <p:nvPicPr>
+            <p:cNvPr id="3" name="Picture 2">
+              <a:extLst>
+                <a:ext uri="{FF2B5EF4-FFF2-40B4-BE49-F238E27FC236}">
+                  <a16:creationId xmlns:a16="http://schemas.microsoft.com/office/drawing/2014/main" id="{47C8FEBD-969D-EB73-D0DE-1404EEB42C6D}"/>
+                </a:ext>
+              </a:extLst>
+            </p:cNvPr>
+            <p:cNvPicPr>
+              <a:picLocks noChangeAspect="1"/>
+            </p:cNvPicPr>
+            <p:nvPr/>
+          </p:nvPicPr>
+          <p:blipFill rotWithShape="1">
+            <a:blip r:embed="rId3"/>
+            <a:srcRect l="2018" t="4388"/>
+            <a:stretch/>
+          </p:blipFill>
+          <p:spPr>
+            <a:xfrm>
+              <a:off x="570577" y="2145928"/>
+              <a:ext cx="2136052" cy="1080000"/>
+            </a:xfrm>
+            <a:prstGeom prst="rect">
+              <a:avLst/>
+            </a:prstGeom>
+            <a:ln w="12700">
+              <a:solidFill>
+                <a:schemeClr val="tx1"/>
+              </a:solidFill>
+            </a:ln>
+          </p:spPr>
+        </p:pic>
+        <p:pic>
+          <p:nvPicPr>
+            <p:cNvPr id="5" name="Picture 4">
+              <a:extLst>
+                <a:ext uri="{FF2B5EF4-FFF2-40B4-BE49-F238E27FC236}">
+                  <a16:creationId xmlns:a16="http://schemas.microsoft.com/office/drawing/2014/main" id="{11A45940-07D9-3861-C5AF-843007CC049F}"/>
+                </a:ext>
+              </a:extLst>
+            </p:cNvPr>
+            <p:cNvPicPr>
+              <a:picLocks noChangeAspect="1"/>
+            </p:cNvPicPr>
+            <p:nvPr/>
+          </p:nvPicPr>
+          <p:blipFill rotWithShape="1">
+            <a:blip r:embed="rId4"/>
+            <a:srcRect l="-326" r="-10926"/>
+            <a:stretch/>
+          </p:blipFill>
+          <p:spPr>
+            <a:xfrm>
+              <a:off x="570577" y="3540364"/>
+              <a:ext cx="2136052" cy="1080000"/>
+            </a:xfrm>
+            <a:prstGeom prst="rect">
+              <a:avLst/>
+            </a:prstGeom>
+            <a:ln w="12700">
+              <a:solidFill>
+                <a:schemeClr val="tx1"/>
+              </a:solidFill>
+            </a:ln>
+          </p:spPr>
+        </p:pic>
+        <p:pic>
+          <p:nvPicPr>
+            <p:cNvPr id="8" name="Picture 7">
+              <a:extLst>
+                <a:ext uri="{FF2B5EF4-FFF2-40B4-BE49-F238E27FC236}">
+                  <a16:creationId xmlns:a16="http://schemas.microsoft.com/office/drawing/2014/main" id="{CB0766DC-1E6E-C17E-2477-A32F51F5599B}"/>
+                </a:ext>
+              </a:extLst>
+            </p:cNvPr>
+            <p:cNvPicPr>
+              <a:picLocks noChangeAspect="1"/>
+            </p:cNvPicPr>
+            <p:nvPr/>
+          </p:nvPicPr>
+          <p:blipFill>
+            <a:blip r:embed="rId5"/>
+            <a:stretch>
+              <a:fillRect/>
+            </a:stretch>
+          </p:blipFill>
+          <p:spPr>
+            <a:xfrm>
+              <a:off x="563242" y="751492"/>
+              <a:ext cx="2150722" cy="1080000"/>
+            </a:xfrm>
+            <a:prstGeom prst="rect">
+              <a:avLst/>
+            </a:prstGeom>
+            <a:ln w="12700">
+              <a:solidFill>
+                <a:schemeClr val="tx1"/>
+              </a:solidFill>
+            </a:ln>
+          </p:spPr>
+        </p:pic>
+        <p:pic>
+          <p:nvPicPr>
+            <p:cNvPr id="11" name="Picture 10">
+              <a:extLst>
+                <a:ext uri="{FF2B5EF4-FFF2-40B4-BE49-F238E27FC236}">
+                  <a16:creationId xmlns:a16="http://schemas.microsoft.com/office/drawing/2014/main" id="{B46478F9-3807-8824-C5CB-2F7302B27077}"/>
+                </a:ext>
+              </a:extLst>
+            </p:cNvPr>
+            <p:cNvPicPr>
+              <a:picLocks noChangeAspect="1"/>
+            </p:cNvPicPr>
+            <p:nvPr/>
+          </p:nvPicPr>
+          <p:blipFill>
+            <a:blip r:embed="rId6"/>
+            <a:stretch>
+              <a:fillRect/>
+            </a:stretch>
+          </p:blipFill>
+          <p:spPr>
+            <a:xfrm>
+              <a:off x="563242" y="4934801"/>
+              <a:ext cx="2150722" cy="1080000"/>
+            </a:xfrm>
+            <a:prstGeom prst="rect">
+              <a:avLst/>
+            </a:prstGeom>
+            <a:ln w="12700">
+              <a:solidFill>
+                <a:schemeClr val="tx1"/>
+              </a:solidFill>
+            </a:ln>
+          </p:spPr>
+        </p:pic>
+        <p:pic>
+          <p:nvPicPr>
+            <p:cNvPr id="15" name="Picture 14">
+              <a:extLst>
+                <a:ext uri="{FF2B5EF4-FFF2-40B4-BE49-F238E27FC236}">
+                  <a16:creationId xmlns:a16="http://schemas.microsoft.com/office/drawing/2014/main" id="{C4B903EB-C051-8B99-4FDE-6055B0AE9BE2}"/>
+                </a:ext>
+              </a:extLst>
+            </p:cNvPr>
+            <p:cNvPicPr>
+              <a:picLocks noChangeAspect="1"/>
+            </p:cNvPicPr>
+            <p:nvPr/>
+          </p:nvPicPr>
+          <p:blipFill>
+            <a:blip r:embed="rId7"/>
+            <a:stretch>
+              <a:fillRect/>
+            </a:stretch>
+          </p:blipFill>
+          <p:spPr>
+            <a:xfrm>
+              <a:off x="8982286" y="2698250"/>
+              <a:ext cx="2480499" cy="1245600"/>
+            </a:xfrm>
+            <a:prstGeom prst="rect">
+              <a:avLst/>
+            </a:prstGeom>
+            <a:ln w="12700">
+              <a:solidFill>
+                <a:schemeClr val="tx1"/>
+              </a:solidFill>
+            </a:ln>
+          </p:spPr>
+        </p:pic>
+        <p:cxnSp>
+          <p:nvCxnSpPr>
+            <p:cNvPr id="25" name="Gerade Verbindung mit Pfeil 51">
+              <a:extLst>
+                <a:ext uri="{FF2B5EF4-FFF2-40B4-BE49-F238E27FC236}">
+                  <a16:creationId xmlns:a16="http://schemas.microsoft.com/office/drawing/2014/main" id="{109F8125-8CBC-896B-5FC9-042A4F04D9F9}"/>
+                </a:ext>
+              </a:extLst>
+            </p:cNvPr>
+            <p:cNvCxnSpPr>
+              <a:cxnSpLocks/>
+            </p:cNvCxnSpPr>
+            <p:nvPr/>
+          </p:nvCxnSpPr>
+          <p:spPr>
+            <a:xfrm>
+              <a:off x="2945618" y="1453459"/>
+              <a:ext cx="302400" cy="0"/>
+            </a:xfrm>
+            <a:prstGeom prst="straightConnector1">
+              <a:avLst/>
+            </a:prstGeom>
+            <a:ln w="12700">
+              <a:solidFill>
+                <a:schemeClr val="tx1"/>
+              </a:solidFill>
+              <a:tailEnd type="triangle"/>
+            </a:ln>
+          </p:spPr>
+          <p:style>
+            <a:lnRef idx="1">
+              <a:schemeClr val="accent1"/>
+            </a:lnRef>
+            <a:fillRef idx="0">
+              <a:schemeClr val="accent1"/>
+            </a:fillRef>
+            <a:effectRef idx="0">
+              <a:schemeClr val="accent1"/>
+            </a:effectRef>
+            <a:fontRef idx="minor">
+              <a:schemeClr val="tx1"/>
+            </a:fontRef>
+          </p:style>
+        </p:cxnSp>
+        <p:cxnSp>
+          <p:nvCxnSpPr>
+            <p:cNvPr id="26" name="Gerade Verbindung mit Pfeil 51">
+              <a:extLst>
+                <a:ext uri="{FF2B5EF4-FFF2-40B4-BE49-F238E27FC236}">
+                  <a16:creationId xmlns:a16="http://schemas.microsoft.com/office/drawing/2014/main" id="{68BE3197-C4A6-834E-1637-F7A63E734404}"/>
+                </a:ext>
+              </a:extLst>
+            </p:cNvPr>
+            <p:cNvCxnSpPr>
+              <a:cxnSpLocks/>
+            </p:cNvCxnSpPr>
+            <p:nvPr/>
+          </p:nvCxnSpPr>
+          <p:spPr>
+            <a:xfrm>
+              <a:off x="2945618" y="5150866"/>
+              <a:ext cx="302400" cy="0"/>
+            </a:xfrm>
+            <a:prstGeom prst="straightConnector1">
+              <a:avLst/>
+            </a:prstGeom>
+            <a:ln w="12700">
+              <a:solidFill>
+                <a:schemeClr val="tx1"/>
+              </a:solidFill>
+              <a:tailEnd type="triangle"/>
+            </a:ln>
+          </p:spPr>
+          <p:style>
+            <a:lnRef idx="1">
+              <a:schemeClr val="accent1"/>
+            </a:lnRef>
+            <a:fillRef idx="0">
+              <a:schemeClr val="accent1"/>
+            </a:fillRef>
+            <a:effectRef idx="0">
+              <a:schemeClr val="accent1"/>
+            </a:effectRef>
+            <a:fontRef idx="minor">
+              <a:schemeClr val="tx1"/>
+            </a:fontRef>
+          </p:style>
+        </p:cxnSp>
+        <p:cxnSp>
+          <p:nvCxnSpPr>
+            <p:cNvPr id="32" name="Gerade Verbindung mit Pfeil 51">
+              <a:extLst>
+                <a:ext uri="{FF2B5EF4-FFF2-40B4-BE49-F238E27FC236}">
+                  <a16:creationId xmlns:a16="http://schemas.microsoft.com/office/drawing/2014/main" id="{A30EF417-DCB2-A4FC-D711-D7824CEB1596}"/>
+                </a:ext>
+              </a:extLst>
+            </p:cNvPr>
+            <p:cNvCxnSpPr>
+              <a:cxnSpLocks/>
+            </p:cNvCxnSpPr>
+            <p:nvPr/>
+          </p:nvCxnSpPr>
+          <p:spPr>
+            <a:xfrm>
+              <a:off x="2945618" y="1993459"/>
+              <a:ext cx="452418" cy="565814"/>
+            </a:xfrm>
+            <a:prstGeom prst="straightConnector1">
+              <a:avLst/>
+            </a:prstGeom>
+            <a:ln w="12700">
+              <a:solidFill>
+                <a:schemeClr val="tx1"/>
+              </a:solidFill>
+              <a:tailEnd type="triangle"/>
+            </a:ln>
+          </p:spPr>
+          <p:style>
+            <a:lnRef idx="1">
+              <a:schemeClr val="accent1"/>
+            </a:lnRef>
+            <a:fillRef idx="0">
+              <a:schemeClr val="accent1"/>
+            </a:fillRef>
+            <a:effectRef idx="0">
+              <a:schemeClr val="accent1"/>
+            </a:effectRef>
+            <a:fontRef idx="minor">
+              <a:schemeClr val="tx1"/>
+            </a:fontRef>
+          </p:style>
+        </p:cxnSp>
+        <p:cxnSp>
+          <p:nvCxnSpPr>
+            <p:cNvPr id="39" name="Gerade Verbindung mit Pfeil 51">
+              <a:extLst>
+                <a:ext uri="{FF2B5EF4-FFF2-40B4-BE49-F238E27FC236}">
+                  <a16:creationId xmlns:a16="http://schemas.microsoft.com/office/drawing/2014/main" id="{0E36AB8B-7344-D798-00B3-F552EC5E114E}"/>
+                </a:ext>
+              </a:extLst>
+            </p:cNvPr>
+            <p:cNvCxnSpPr>
+              <a:cxnSpLocks/>
+            </p:cNvCxnSpPr>
+            <p:nvPr/>
+          </p:nvCxnSpPr>
+          <p:spPr>
+            <a:xfrm>
+              <a:off x="2945618" y="3647461"/>
+              <a:ext cx="302400" cy="0"/>
+            </a:xfrm>
+            <a:prstGeom prst="straightConnector1">
+              <a:avLst/>
+            </a:prstGeom>
+            <a:ln w="12700">
+              <a:solidFill>
+                <a:schemeClr val="tx1"/>
+              </a:solidFill>
+              <a:tailEnd type="triangle"/>
+            </a:ln>
+          </p:spPr>
+          <p:style>
+            <a:lnRef idx="1">
+              <a:schemeClr val="accent1"/>
+            </a:lnRef>
+            <a:fillRef idx="0">
+              <a:schemeClr val="accent1"/>
+            </a:fillRef>
+            <a:effectRef idx="0">
+              <a:schemeClr val="accent1"/>
+            </a:effectRef>
+            <a:fontRef idx="minor">
+              <a:schemeClr val="tx1"/>
+            </a:fontRef>
+          </p:style>
+        </p:cxnSp>
+        <p:cxnSp>
+          <p:nvCxnSpPr>
+            <p:cNvPr id="40" name="Gerade Verbindung mit Pfeil 51">
+              <a:extLst>
+                <a:ext uri="{FF2B5EF4-FFF2-40B4-BE49-F238E27FC236}">
+                  <a16:creationId xmlns:a16="http://schemas.microsoft.com/office/drawing/2014/main" id="{A017A5BD-E4CF-A3CE-E67A-A34BDC717E91}"/>
+                </a:ext>
+              </a:extLst>
+            </p:cNvPr>
+            <p:cNvCxnSpPr>
+              <a:cxnSpLocks/>
+            </p:cNvCxnSpPr>
+            <p:nvPr/>
+          </p:nvCxnSpPr>
+          <p:spPr>
+            <a:xfrm>
+              <a:off x="2945618" y="2962615"/>
+              <a:ext cx="302400" cy="0"/>
+            </a:xfrm>
+            <a:prstGeom prst="straightConnector1">
+              <a:avLst/>
+            </a:prstGeom>
+            <a:ln w="12700">
+              <a:solidFill>
+                <a:schemeClr val="tx1"/>
+              </a:solidFill>
+              <a:tailEnd type="triangle"/>
+            </a:ln>
+          </p:spPr>
+          <p:style>
+            <a:lnRef idx="1">
+              <a:schemeClr val="accent1"/>
+            </a:lnRef>
+            <a:fillRef idx="0">
+              <a:schemeClr val="accent1"/>
+            </a:fillRef>
+            <a:effectRef idx="0">
+              <a:schemeClr val="accent1"/>
+            </a:effectRef>
+            <a:fontRef idx="minor">
+              <a:schemeClr val="tx1"/>
+            </a:fontRef>
+          </p:style>
+        </p:cxnSp>
+        <p:cxnSp>
+          <p:nvCxnSpPr>
+            <p:cNvPr id="42" name="Gerade Verbindung mit Pfeil 51">
+              <a:extLst>
+                <a:ext uri="{FF2B5EF4-FFF2-40B4-BE49-F238E27FC236}">
+                  <a16:creationId xmlns:a16="http://schemas.microsoft.com/office/drawing/2014/main" id="{31AEC79F-2FED-2473-B7FA-C2C92B4C2C77}"/>
+                </a:ext>
+              </a:extLst>
+            </p:cNvPr>
+            <p:cNvCxnSpPr>
+              <a:cxnSpLocks/>
+            </p:cNvCxnSpPr>
+            <p:nvPr/>
+          </p:nvCxnSpPr>
+          <p:spPr>
+            <a:xfrm flipH="1">
+              <a:off x="8542562" y="3321050"/>
+              <a:ext cx="302400" cy="0"/>
+            </a:xfrm>
+            <a:prstGeom prst="straightConnector1">
+              <a:avLst/>
+            </a:prstGeom>
+            <a:ln w="12700">
+              <a:solidFill>
+                <a:schemeClr val="tx1"/>
+              </a:solidFill>
+              <a:tailEnd type="triangle"/>
+            </a:ln>
+          </p:spPr>
+          <p:style>
+            <a:lnRef idx="1">
+              <a:schemeClr val="accent1"/>
+            </a:lnRef>
+            <a:fillRef idx="0">
+              <a:schemeClr val="accent1"/>
+            </a:fillRef>
+            <a:effectRef idx="0">
+              <a:schemeClr val="accent1"/>
+            </a:effectRef>
+            <a:fontRef idx="minor">
+              <a:schemeClr val="tx1"/>
+            </a:fontRef>
+          </p:style>
+        </p:cxnSp>
+        <p:cxnSp>
+          <p:nvCxnSpPr>
+            <p:cNvPr id="48" name="Gerade Verbindung mit Pfeil 19">
+              <a:extLst>
+                <a:ext uri="{FF2B5EF4-FFF2-40B4-BE49-F238E27FC236}">
+                  <a16:creationId xmlns:a16="http://schemas.microsoft.com/office/drawing/2014/main" id="{AC649EF0-8113-AC4C-73DA-9F217C5B8192}"/>
+                </a:ext>
+              </a:extLst>
+            </p:cNvPr>
+            <p:cNvCxnSpPr>
+              <a:cxnSpLocks/>
+            </p:cNvCxnSpPr>
+            <p:nvPr/>
+          </p:nvCxnSpPr>
+          <p:spPr>
+            <a:xfrm flipV="1">
+              <a:off x="5111450" y="3899018"/>
+              <a:ext cx="369695" cy="382083"/>
+            </a:xfrm>
+            <a:prstGeom prst="straightConnector1">
+              <a:avLst/>
+            </a:prstGeom>
+            <a:ln w="12700">
               <a:solidFill>
                 <a:schemeClr val="tx1"/>
               </a:solidFill>
@@ -4955,10 +5211,10 @@
         </p:cxnSp>
         <p:sp>
           <p:nvSpPr>
-            <p:cNvPr id="30" name="TextBox 29">
+            <p:cNvPr id="53" name="TextBox 52">
               <a:extLst>
                 <a:ext uri="{FF2B5EF4-FFF2-40B4-BE49-F238E27FC236}">
-                  <a16:creationId xmlns:a16="http://schemas.microsoft.com/office/drawing/2014/main" id="{FEAC4CA7-574A-7F4C-B561-06EA89585BC9}"/>
+                  <a16:creationId xmlns:a16="http://schemas.microsoft.com/office/drawing/2014/main" id="{016ED613-3904-CB34-42E6-CC6AFFA2D31A}"/>
                 </a:ext>
               </a:extLst>
             </p:cNvPr>
@@ -4967,13 +5223,16 @@
           </p:nvSpPr>
           <p:spPr>
             <a:xfrm>
-              <a:off x="8249771" y="3266988"/>
-              <a:ext cx="3906839" cy="369332"/>
+              <a:off x="945144" y="491607"/>
+              <a:ext cx="1386918" cy="276999"/>
             </a:xfrm>
             <a:prstGeom prst="rect">
               <a:avLst/>
             </a:prstGeom>
             <a:noFill/>
+            <a:ln w="12700">
+              <a:noFill/>
+            </a:ln>
           </p:spPr>
           <p:txBody>
             <a:bodyPr wrap="none" rtlCol="0">
@@ -4982,32 +5241,489 @@
             <a:lstStyle/>
             <a:p>
               <a:r>
-                <a:rPr lang="en-US" dirty="0">
-                  <a:latin typeface="Courier" pitchFamily="2" charset="0"/>
+                <a:rPr lang="en-US" sz="1200" dirty="0">
+                  <a:latin typeface="Arial" panose="020B0604020202020204" pitchFamily="34" charset="0"/>
+                  <a:cs typeface="Arial" panose="020B0604020202020204" pitchFamily="34" charset="0"/>
                 </a:rPr>
-                <a:t>flip(MAP(</a:t>
+                <a:t>Mutual exclusivity</a:t>
               </a:r>
+            </a:p>
+          </p:txBody>
+        </p:sp>
+        <p:sp>
+          <p:nvSpPr>
+            <p:cNvPr id="54" name="TextBox 53">
+              <a:extLst>
+                <a:ext uri="{FF2B5EF4-FFF2-40B4-BE49-F238E27FC236}">
+                  <a16:creationId xmlns:a16="http://schemas.microsoft.com/office/drawing/2014/main" id="{EF699075-9D9A-89A5-F013-8AFF114C7A57}"/>
+                </a:ext>
+              </a:extLst>
+            </p:cNvPr>
+            <p:cNvSpPr txBox="1"/>
+            <p:nvPr/>
+          </p:nvSpPr>
+          <p:spPr>
+            <a:xfrm>
+              <a:off x="819083" y="1889495"/>
+              <a:ext cx="1639038" cy="276999"/>
+            </a:xfrm>
+            <a:prstGeom prst="rect">
+              <a:avLst/>
+            </a:prstGeom>
+            <a:noFill/>
+            <a:ln w="12700">
+              <a:noFill/>
+            </a:ln>
+          </p:spPr>
+          <p:txBody>
+            <a:bodyPr wrap="none" rtlCol="0">
+              <a:spAutoFit/>
+            </a:bodyPr>
+            <a:lstStyle/>
+            <a:p>
               <a:r>
-                <a:rPr lang="en-US" dirty="0" err="1">
-                  <a:latin typeface="Courier" pitchFamily="2" charset="0"/>
+                <a:rPr lang="en-US" sz="1200" dirty="0">
+                  <a:latin typeface="Arial" panose="020B0604020202020204" pitchFamily="34" charset="0"/>
+                  <a:cs typeface="Arial" panose="020B0604020202020204" pitchFamily="34" charset="0"/>
                 </a:rPr>
-                <a:t>model_prediction</a:t>
+                <a:t>Word comprehension</a:t>
               </a:r>
+            </a:p>
+          </p:txBody>
+        </p:sp>
+        <p:sp>
+          <p:nvSpPr>
+            <p:cNvPr id="55" name="TextBox 54">
+              <a:extLst>
+                <a:ext uri="{FF2B5EF4-FFF2-40B4-BE49-F238E27FC236}">
+                  <a16:creationId xmlns:a16="http://schemas.microsoft.com/office/drawing/2014/main" id="{B77ACF79-A47F-E851-0148-D9B5ED3ADBA8}"/>
+                </a:ext>
+              </a:extLst>
+            </p:cNvPr>
+            <p:cNvSpPr txBox="1"/>
+            <p:nvPr/>
+          </p:nvSpPr>
+          <p:spPr>
+            <a:xfrm>
+              <a:off x="984994" y="3293456"/>
+              <a:ext cx="1307217" cy="276999"/>
+            </a:xfrm>
+            <a:prstGeom prst="rect">
+              <a:avLst/>
+            </a:prstGeom>
+            <a:noFill/>
+            <a:ln w="12700">
+              <a:noFill/>
+            </a:ln>
+          </p:spPr>
+          <p:txBody>
+            <a:bodyPr wrap="none" rtlCol="0">
+              <a:spAutoFit/>
+            </a:bodyPr>
+            <a:lstStyle/>
+            <a:p>
               <a:r>
-                <a:rPr lang="en-US" dirty="0">
-                  <a:latin typeface="Courier" pitchFamily="2" charset="0"/>
+                <a:rPr lang="en-US" sz="1200" dirty="0">
+                  <a:latin typeface="Arial" panose="020B0604020202020204" pitchFamily="34" charset="0"/>
+                  <a:cs typeface="Arial" panose="020B0604020202020204" pitchFamily="34" charset="0"/>
                 </a:rPr>
-                <a:t>))</a:t>
+                <a:t>Word production</a:t>
+              </a:r>
+            </a:p>
+          </p:txBody>
+        </p:sp>
+        <p:sp>
+          <p:nvSpPr>
+            <p:cNvPr id="56" name="TextBox 55">
+              <a:extLst>
+                <a:ext uri="{FF2B5EF4-FFF2-40B4-BE49-F238E27FC236}">
+                  <a16:creationId xmlns:a16="http://schemas.microsoft.com/office/drawing/2014/main" id="{E5AF5504-C72F-824F-FDEB-3EEF3671A710}"/>
+                </a:ext>
+              </a:extLst>
+            </p:cNvPr>
+            <p:cNvSpPr txBox="1"/>
+            <p:nvPr/>
+          </p:nvSpPr>
+          <p:spPr>
+            <a:xfrm>
+              <a:off x="915488" y="4680607"/>
+              <a:ext cx="1446230" cy="276999"/>
+            </a:xfrm>
+            <a:prstGeom prst="rect">
+              <a:avLst/>
+            </a:prstGeom>
+            <a:noFill/>
+            <a:ln w="12700">
+              <a:noFill/>
+            </a:ln>
+          </p:spPr>
+          <p:txBody>
+            <a:bodyPr wrap="none" rtlCol="0">
+              <a:spAutoFit/>
+            </a:bodyPr>
+            <a:lstStyle/>
+            <a:p>
+              <a:r>
+                <a:rPr lang="en-US" sz="1200" dirty="0">
+                  <a:latin typeface="Arial" panose="020B0604020202020204" pitchFamily="34" charset="0"/>
+                  <a:cs typeface="Arial" panose="020B0604020202020204" pitchFamily="34" charset="0"/>
+                </a:rPr>
+                <a:t>Discourse novelty</a:t>
+              </a:r>
+            </a:p>
+          </p:txBody>
+        </p:sp>
+        <p:sp>
+          <p:nvSpPr>
+            <p:cNvPr id="30" name="TextBox 29">
+              <a:extLst>
+                <a:ext uri="{FF2B5EF4-FFF2-40B4-BE49-F238E27FC236}">
+                  <a16:creationId xmlns:a16="http://schemas.microsoft.com/office/drawing/2014/main" id="{370EC907-9F04-1395-5457-B36562872F15}"/>
+                </a:ext>
+              </a:extLst>
+            </p:cNvPr>
+            <p:cNvSpPr txBox="1"/>
+            <p:nvPr/>
+          </p:nvSpPr>
+          <p:spPr>
+            <a:xfrm>
+              <a:off x="9696754" y="2429460"/>
+              <a:ext cx="1043876" cy="276999"/>
+            </a:xfrm>
+            <a:prstGeom prst="rect">
+              <a:avLst/>
+            </a:prstGeom>
+            <a:noFill/>
+            <a:ln w="12700">
+              <a:noFill/>
+            </a:ln>
+          </p:spPr>
+          <p:txBody>
+            <a:bodyPr wrap="none" rtlCol="0">
+              <a:spAutoFit/>
+            </a:bodyPr>
+            <a:lstStyle/>
+            <a:p>
+              <a:r>
+                <a:rPr lang="en-US" sz="1200" dirty="0">
+                  <a:latin typeface="Arial" panose="020B0604020202020204" pitchFamily="34" charset="0"/>
+                  <a:cs typeface="Arial" panose="020B0604020202020204" pitchFamily="34" charset="0"/>
+                </a:rPr>
+                <a:t>Combination</a:t>
+              </a:r>
+            </a:p>
+          </p:txBody>
+        </p:sp>
+        <p:sp>
+          <p:nvSpPr>
+            <p:cNvPr id="31" name="TextBox 30">
+              <a:extLst>
+                <a:ext uri="{FF2B5EF4-FFF2-40B4-BE49-F238E27FC236}">
+                  <a16:creationId xmlns:a16="http://schemas.microsoft.com/office/drawing/2014/main" id="{8B2AA2BB-D2BD-18F7-2CEC-06410DC928DC}"/>
+                </a:ext>
+              </a:extLst>
+            </p:cNvPr>
+            <p:cNvSpPr txBox="1"/>
+            <p:nvPr/>
+          </p:nvSpPr>
+          <p:spPr>
+            <a:xfrm>
+              <a:off x="7150544" y="2429460"/>
+              <a:ext cx="1308371" cy="276999"/>
+            </a:xfrm>
+            <a:prstGeom prst="rect">
+              <a:avLst/>
+            </a:prstGeom>
+            <a:noFill/>
+            <a:ln w="12700">
+              <a:noFill/>
+            </a:ln>
+          </p:spPr>
+          <p:txBody>
+            <a:bodyPr wrap="none" rtlCol="0">
+              <a:spAutoFit/>
+            </a:bodyPr>
+            <a:lstStyle/>
+            <a:p>
+              <a:r>
+                <a:rPr lang="en-US" sz="1200" dirty="0">
+                  <a:latin typeface="Arial" panose="020B0604020202020204" pitchFamily="34" charset="0"/>
+                  <a:cs typeface="Arial" panose="020B0604020202020204" pitchFamily="34" charset="0"/>
+                </a:rPr>
+                <a:t>Model prediction</a:t>
+              </a:r>
+            </a:p>
+          </p:txBody>
+        </p:sp>
+        <p:sp>
+          <p:nvSpPr>
+            <p:cNvPr id="33" name="TextBox 32">
+              <a:extLst>
+                <a:ext uri="{FF2B5EF4-FFF2-40B4-BE49-F238E27FC236}">
+                  <a16:creationId xmlns:a16="http://schemas.microsoft.com/office/drawing/2014/main" id="{3C801525-0BB8-0BA0-D83C-2EE52595E108}"/>
+                </a:ext>
+              </a:extLst>
+            </p:cNvPr>
+            <p:cNvSpPr txBox="1"/>
+            <p:nvPr/>
+          </p:nvSpPr>
+          <p:spPr>
+            <a:xfrm>
+              <a:off x="3196487" y="741734"/>
+              <a:ext cx="1872629" cy="276999"/>
+            </a:xfrm>
+            <a:prstGeom prst="rect">
+              <a:avLst/>
+            </a:prstGeom>
+            <a:noFill/>
+            <a:ln w="12700">
+              <a:noFill/>
+            </a:ln>
+          </p:spPr>
+          <p:txBody>
+            <a:bodyPr wrap="none" rtlCol="0">
+              <a:spAutoFit/>
+            </a:bodyPr>
+            <a:lstStyle/>
+            <a:p>
+              <a:r>
+                <a:rPr lang="en-US" sz="1200" dirty="0">
+                  <a:latin typeface="Arial" panose="020B0604020202020204" pitchFamily="34" charset="0"/>
+                  <a:cs typeface="Arial" panose="020B0604020202020204" pitchFamily="34" charset="0"/>
+                </a:rPr>
+                <a:t>Speaker informativeness</a:t>
+              </a:r>
+            </a:p>
+          </p:txBody>
+        </p:sp>
+        <p:pic>
+          <p:nvPicPr>
+            <p:cNvPr id="9" name="Picture 8">
+              <a:extLst>
+                <a:ext uri="{FF2B5EF4-FFF2-40B4-BE49-F238E27FC236}">
+                  <a16:creationId xmlns:a16="http://schemas.microsoft.com/office/drawing/2014/main" id="{72CD7680-F89D-5C21-4E85-6D6DAE650E35}"/>
+                </a:ext>
+              </a:extLst>
+            </p:cNvPr>
+            <p:cNvPicPr>
+              <a:picLocks noChangeAspect="1"/>
+            </p:cNvPicPr>
+            <p:nvPr/>
+          </p:nvPicPr>
+          <p:blipFill>
+            <a:blip r:embed="rId8"/>
+            <a:stretch>
+              <a:fillRect/>
+            </a:stretch>
+          </p:blipFill>
+          <p:spPr>
+            <a:xfrm>
+              <a:off x="7178649" y="2679102"/>
+              <a:ext cx="1242000" cy="1242000"/>
+            </a:xfrm>
+            <a:prstGeom prst="rect">
+              <a:avLst/>
+            </a:prstGeom>
+            <a:ln w="12700">
+              <a:solidFill>
+                <a:schemeClr val="tx1"/>
+              </a:solidFill>
+            </a:ln>
+          </p:spPr>
+        </p:pic>
+        <p:pic>
+          <p:nvPicPr>
+            <p:cNvPr id="12" name="Picture 11">
+              <a:extLst>
+                <a:ext uri="{FF2B5EF4-FFF2-40B4-BE49-F238E27FC236}">
+                  <a16:creationId xmlns:a16="http://schemas.microsoft.com/office/drawing/2014/main" id="{716FCA9B-780E-E1F2-0E01-F48650F2C758}"/>
+                </a:ext>
+              </a:extLst>
+            </p:cNvPr>
+            <p:cNvPicPr>
+              <a:picLocks noChangeAspect="1"/>
+            </p:cNvPicPr>
+            <p:nvPr/>
+          </p:nvPicPr>
+          <p:blipFill>
+            <a:blip r:embed="rId9"/>
+            <a:stretch>
+              <a:fillRect/>
+            </a:stretch>
+          </p:blipFill>
+          <p:spPr>
+            <a:xfrm>
+              <a:off x="3511801" y="1018733"/>
+              <a:ext cx="1242000" cy="1242000"/>
+            </a:xfrm>
+            <a:prstGeom prst="rect">
+              <a:avLst/>
+            </a:prstGeom>
+            <a:ln w="12700">
+              <a:solidFill>
+                <a:schemeClr val="tx1"/>
+              </a:solidFill>
+            </a:ln>
+          </p:spPr>
+        </p:pic>
+        <p:pic>
+          <p:nvPicPr>
+            <p:cNvPr id="16" name="Picture 15">
+              <a:extLst>
+                <a:ext uri="{FF2B5EF4-FFF2-40B4-BE49-F238E27FC236}">
+                  <a16:creationId xmlns:a16="http://schemas.microsoft.com/office/drawing/2014/main" id="{8A2F8506-3F1F-DE81-DFA1-9911BED3D1B6}"/>
+                </a:ext>
+              </a:extLst>
+            </p:cNvPr>
+            <p:cNvPicPr>
+              <a:picLocks noChangeAspect="1"/>
+            </p:cNvPicPr>
+            <p:nvPr/>
+          </p:nvPicPr>
+          <p:blipFill>
+            <a:blip r:embed="rId10"/>
+            <a:stretch>
+              <a:fillRect/>
+            </a:stretch>
+          </p:blipFill>
+          <p:spPr>
+            <a:xfrm>
+              <a:off x="3511801" y="4529866"/>
+              <a:ext cx="1242000" cy="1242000"/>
+            </a:xfrm>
+            <a:prstGeom prst="rect">
+              <a:avLst/>
+            </a:prstGeom>
+            <a:ln w="12700">
+              <a:solidFill>
+                <a:schemeClr val="tx1"/>
+              </a:solidFill>
+            </a:ln>
+          </p:spPr>
+        </p:pic>
+        <p:pic>
+          <p:nvPicPr>
+            <p:cNvPr id="19" name="Picture 18">
+              <a:extLst>
+                <a:ext uri="{FF2B5EF4-FFF2-40B4-BE49-F238E27FC236}">
+                  <a16:creationId xmlns:a16="http://schemas.microsoft.com/office/drawing/2014/main" id="{D53F2968-F56C-805E-5150-D35014956ED2}"/>
+                </a:ext>
+              </a:extLst>
+            </p:cNvPr>
+            <p:cNvPicPr>
+              <a:picLocks noChangeAspect="1"/>
+            </p:cNvPicPr>
+            <p:nvPr/>
+          </p:nvPicPr>
+          <p:blipFill>
+            <a:blip r:embed="rId11"/>
+            <a:stretch>
+              <a:fillRect/>
+            </a:stretch>
+          </p:blipFill>
+          <p:spPr>
+            <a:xfrm>
+              <a:off x="3511801" y="2774300"/>
+              <a:ext cx="1242000" cy="1242000"/>
+            </a:xfrm>
+            <a:prstGeom prst="rect">
+              <a:avLst/>
+            </a:prstGeom>
+            <a:ln w="12700">
+              <a:solidFill>
+                <a:schemeClr val="tx1"/>
+              </a:solidFill>
+            </a:ln>
+          </p:spPr>
+        </p:pic>
+        <p:sp>
+          <p:nvSpPr>
+            <p:cNvPr id="41" name="TextBox 40">
+              <a:extLst>
+                <a:ext uri="{FF2B5EF4-FFF2-40B4-BE49-F238E27FC236}">
+                  <a16:creationId xmlns:a16="http://schemas.microsoft.com/office/drawing/2014/main" id="{E0AE128E-5F96-C9E6-B5CE-3E845B0FF1D6}"/>
+                </a:ext>
+              </a:extLst>
+            </p:cNvPr>
+            <p:cNvSpPr txBox="1"/>
+            <p:nvPr/>
+          </p:nvSpPr>
+          <p:spPr>
+            <a:xfrm>
+              <a:off x="3333544" y="2494568"/>
+              <a:ext cx="1598515" cy="276999"/>
+            </a:xfrm>
+            <a:prstGeom prst="rect">
+              <a:avLst/>
+            </a:prstGeom>
+            <a:noFill/>
+            <a:ln w="12700">
+              <a:noFill/>
+            </a:ln>
+          </p:spPr>
+          <p:txBody>
+            <a:bodyPr wrap="none" rtlCol="0">
+              <a:spAutoFit/>
+            </a:bodyPr>
+            <a:lstStyle/>
+            <a:p>
+              <a:r>
+                <a:rPr lang="en-US" sz="1200" dirty="0">
+                  <a:latin typeface="Arial" panose="020B0604020202020204" pitchFamily="34" charset="0"/>
+                  <a:cs typeface="Arial" panose="020B0604020202020204" pitchFamily="34" charset="0"/>
+                </a:rPr>
+                <a:t>Semantic knowledge</a:t>
+              </a:r>
+            </a:p>
+          </p:txBody>
+        </p:sp>
+        <p:sp>
+          <p:nvSpPr>
+            <p:cNvPr id="43" name="TextBox 42">
+              <a:extLst>
+                <a:ext uri="{FF2B5EF4-FFF2-40B4-BE49-F238E27FC236}">
+                  <a16:creationId xmlns:a16="http://schemas.microsoft.com/office/drawing/2014/main" id="{DB372633-BBBA-7801-61F0-8737D0D8E100}"/>
+                </a:ext>
+              </a:extLst>
+            </p:cNvPr>
+            <p:cNvSpPr txBox="1"/>
+            <p:nvPr/>
+          </p:nvSpPr>
+          <p:spPr>
+            <a:xfrm>
+              <a:off x="3033782" y="4244030"/>
+              <a:ext cx="2198038" cy="276999"/>
+            </a:xfrm>
+            <a:prstGeom prst="rect">
+              <a:avLst/>
+            </a:prstGeom>
+            <a:noFill/>
+            <a:ln w="12700">
+              <a:noFill/>
+            </a:ln>
+          </p:spPr>
+          <p:txBody>
+            <a:bodyPr wrap="none" rtlCol="0">
+              <a:spAutoFit/>
+            </a:bodyPr>
+            <a:lstStyle/>
+            <a:p>
+              <a:r>
+                <a:rPr lang="en-US" sz="1200" dirty="0">
+                  <a:latin typeface="Arial" panose="020B0604020202020204" pitchFamily="34" charset="0"/>
+                  <a:cs typeface="Arial" panose="020B0604020202020204" pitchFamily="34" charset="0"/>
+                </a:rPr>
+                <a:t>Sensitivity to common ground</a:t>
               </a:r>
             </a:p>
           </p:txBody>
         </p:sp>
         <p:cxnSp>
           <p:nvCxnSpPr>
-            <p:cNvPr id="31" name="Gerade Verbindung mit Pfeil 51">
+            <p:cNvPr id="46" name="Gerade Verbindung mit Pfeil 19">
               <a:extLst>
                 <a:ext uri="{FF2B5EF4-FFF2-40B4-BE49-F238E27FC236}">
-                  <a16:creationId xmlns:a16="http://schemas.microsoft.com/office/drawing/2014/main" id="{5C5F948E-3F4F-E549-8F30-8B3DB1630D6F}"/>
+                  <a16:creationId xmlns:a16="http://schemas.microsoft.com/office/drawing/2014/main" id="{F5D899FD-AACA-84D5-068C-874B2F09BB0B}"/>
                 </a:ext>
               </a:extLst>
             </p:cNvPr>
@@ -5018,13 +5734,13 @@
           </p:nvCxnSpPr>
           <p:spPr>
             <a:xfrm>
-              <a:off x="7783769" y="3451654"/>
-              <a:ext cx="466002" cy="0"/>
+              <a:off x="5039353" y="2397649"/>
+              <a:ext cx="369695" cy="382083"/>
             </a:xfrm>
             <a:prstGeom prst="straightConnector1">
               <a:avLst/>
             </a:prstGeom>
-            <a:ln w="57150">
+            <a:ln w="12700">
               <a:solidFill>
                 <a:schemeClr val="tx1"/>
               </a:solidFill>

</xml_diff>